<commit_message>
Revised 3.6 and PPT
</commit_message>
<xml_diff>
--- a/KaipingAdina's Section Material/Lab2_DescriptiveStats/Section3_DescStats.pptx
+++ b/KaipingAdina's Section Material/Lab2_DescriptiveStats/Section3_DescStats.pptx
@@ -152,7 +152,7 @@
   </p:defaultTextStyle>
   <p:extLst>
     <p:ext uri="{EFAFB233-063F-42B5-8137-9DF3F51BA10A}">
-      <p15:sldGuideLst xmlns="" xmlns:p15="http://schemas.microsoft.com/office/powerpoint/2012/main">
+      <p15:sldGuideLst xmlns:p15="http://schemas.microsoft.com/office/powerpoint/2012/main">
         <p15:guide id="1" orient="horz" pos="1620">
           <p15:clr>
             <a:srgbClr val="A4A3A4"/>
@@ -940,7 +940,7 @@
           <a:p>
             <a:r>
               <a:rPr lang="en-US" dirty="0" smtClean="0"/>
-              <a:t>6 minutes</a:t>
+              <a:t>Shall we remove this slide?</a:t>
             </a:r>
             <a:endParaRPr lang="en-US" dirty="0"/>
           </a:p>
@@ -964,7 +964,7 @@
             <a:fld id="{1E43DE4C-4A49-D64C-946D-CE146930BB8F}" type="slidenum">
               <a:rPr lang="en-US" altLang="x-none" smtClean="0"/>
               <a:pPr/>
-              <a:t>4</a:t>
+              <a:t>3</a:t>
             </a:fld>
             <a:endParaRPr lang="en-US" altLang="x-none"/>
           </a:p>
@@ -973,7 +973,7 @@
     </p:spTree>
     <p:extLst>
       <p:ext uri="{BB962C8B-B14F-4D97-AF65-F5344CB8AC3E}">
-        <p14:creationId xmlns:p14="http://schemas.microsoft.com/office/powerpoint/2010/main" val="1591834426"/>
+        <p14:creationId xmlns:p14="http://schemas.microsoft.com/office/powerpoint/2010/main" val="1635929387"/>
       </p:ext>
     </p:extLst>
   </p:cSld>
@@ -1029,7 +1029,21 @@
           <a:p>
             <a:r>
               <a:rPr lang="en-US" dirty="0" smtClean="0"/>
-              <a:t>6 minutes</a:t>
+              <a:t>6 </a:t>
+            </a:r>
+            <a:r>
+              <a:rPr lang="en-US" dirty="0" smtClean="0"/>
+              <a:t>minutes.</a:t>
+            </a:r>
+          </a:p>
+          <a:p>
+            <a:r>
+              <a:rPr lang="en-US" dirty="0" smtClean="0"/>
+              <a:t>How</a:t>
+            </a:r>
+            <a:r>
+              <a:rPr lang="en-US" baseline="0" dirty="0" smtClean="0"/>
+              <a:t> are we going to ask them to answer? Each group in charge of two? Or we just let then raise hand to say answers?</a:t>
             </a:r>
             <a:endParaRPr lang="en-US" dirty="0"/>
           </a:p>
@@ -1053,7 +1067,7 @@
             <a:fld id="{1E43DE4C-4A49-D64C-946D-CE146930BB8F}" type="slidenum">
               <a:rPr lang="en-US" altLang="x-none" smtClean="0"/>
               <a:pPr/>
-              <a:t>5</a:t>
+              <a:t>4</a:t>
             </a:fld>
             <a:endParaRPr lang="en-US" altLang="x-none"/>
           </a:p>
@@ -1116,6 +1130,10 @@
           <a:bodyPr/>
           <a:lstStyle/>
           <a:p>
+            <a:r>
+              <a:rPr lang="en-US" dirty="0" smtClean="0"/>
+              <a:t>6 minutes</a:t>
+            </a:r>
             <a:endParaRPr lang="en-US" dirty="0"/>
           </a:p>
         </p:txBody>
@@ -1138,7 +1156,7 @@
             <a:fld id="{1E43DE4C-4A49-D64C-946D-CE146930BB8F}" type="slidenum">
               <a:rPr lang="en-US" altLang="x-none" smtClean="0"/>
               <a:pPr/>
-              <a:t>7</a:t>
+              <a:t>5</a:t>
             </a:fld>
             <a:endParaRPr lang="en-US" altLang="x-none"/>
           </a:p>
@@ -1147,7 +1165,7 @@
     </p:spTree>
     <p:extLst>
       <p:ext uri="{BB962C8B-B14F-4D97-AF65-F5344CB8AC3E}">
-        <p14:creationId xmlns:p14="http://schemas.microsoft.com/office/powerpoint/2010/main" val="609923456"/>
+        <p14:creationId xmlns:p14="http://schemas.microsoft.com/office/powerpoint/2010/main" val="1591834426"/>
       </p:ext>
     </p:extLst>
   </p:cSld>
@@ -1203,7 +1221,11 @@
           <a:p>
             <a:r>
               <a:rPr lang="en-US" dirty="0" smtClean="0"/>
-              <a:t>6 minutes</a:t>
+              <a:t>Adina,</a:t>
+            </a:r>
+            <a:r>
+              <a:rPr lang="en-US" baseline="0" dirty="0" smtClean="0"/>
+              <a:t> when we teach them this slide, we will show them in R how to draw each of them right?</a:t>
             </a:r>
             <a:endParaRPr lang="en-US" dirty="0"/>
           </a:p>
@@ -1227,6 +1249,95 @@
             <a:fld id="{1E43DE4C-4A49-D64C-946D-CE146930BB8F}" type="slidenum">
               <a:rPr lang="en-US" altLang="x-none" smtClean="0"/>
               <a:pPr/>
+              <a:t>7</a:t>
+            </a:fld>
+            <a:endParaRPr lang="en-US" altLang="x-none"/>
+          </a:p>
+        </p:txBody>
+      </p:sp>
+    </p:spTree>
+    <p:extLst>
+      <p:ext uri="{BB962C8B-B14F-4D97-AF65-F5344CB8AC3E}">
+        <p14:creationId xmlns:p14="http://schemas.microsoft.com/office/powerpoint/2010/main" val="609923456"/>
+      </p:ext>
+    </p:extLst>
+  </p:cSld>
+  <p:clrMapOvr>
+    <a:masterClrMapping/>
+  </p:clrMapOvr>
+</p:notes>
+</file>
+
+<file path=ppt/notesSlides/notesSlide6.xml><?xml version="1.0" encoding="utf-8"?>
+<p:notes xmlns:a="http://schemas.openxmlformats.org/drawingml/2006/main" xmlns:r="http://schemas.openxmlformats.org/officeDocument/2006/relationships" xmlns:p="http://schemas.openxmlformats.org/presentationml/2006/main">
+  <p:cSld>
+    <p:spTree>
+      <p:nvGrpSpPr>
+        <p:cNvPr id="1" name=""/>
+        <p:cNvGrpSpPr/>
+        <p:nvPr/>
+      </p:nvGrpSpPr>
+      <p:grpSpPr>
+        <a:xfrm>
+          <a:off x="0" y="0"/>
+          <a:ext cx="0" cy="0"/>
+          <a:chOff x="0" y="0"/>
+          <a:chExt cx="0" cy="0"/>
+        </a:xfrm>
+      </p:grpSpPr>
+      <p:sp>
+        <p:nvSpPr>
+          <p:cNvPr id="2" name="Slide Image Placeholder 1"/>
+          <p:cNvSpPr>
+            <a:spLocks noGrp="1" noRot="1" noChangeAspect="1"/>
+          </p:cNvSpPr>
+          <p:nvPr>
+            <p:ph type="sldImg"/>
+          </p:nvPr>
+        </p:nvSpPr>
+        <p:spPr/>
+      </p:sp>
+      <p:sp>
+        <p:nvSpPr>
+          <p:cNvPr id="3" name="Notes Placeholder 2"/>
+          <p:cNvSpPr>
+            <a:spLocks noGrp="1"/>
+          </p:cNvSpPr>
+          <p:nvPr>
+            <p:ph type="body" idx="1"/>
+          </p:nvPr>
+        </p:nvSpPr>
+        <p:spPr/>
+        <p:txBody>
+          <a:bodyPr/>
+          <a:lstStyle/>
+          <a:p>
+            <a:r>
+              <a:rPr lang="en-US" dirty="0" smtClean="0"/>
+              <a:t>6 minutes</a:t>
+            </a:r>
+            <a:endParaRPr lang="en-US" dirty="0"/>
+          </a:p>
+        </p:txBody>
+      </p:sp>
+      <p:sp>
+        <p:nvSpPr>
+          <p:cNvPr id="4" name="Slide Number Placeholder 3"/>
+          <p:cNvSpPr>
+            <a:spLocks noGrp="1"/>
+          </p:cNvSpPr>
+          <p:nvPr>
+            <p:ph type="sldNum" sz="quarter" idx="10"/>
+          </p:nvPr>
+        </p:nvSpPr>
+        <p:spPr/>
+        <p:txBody>
+          <a:bodyPr/>
+          <a:lstStyle/>
+          <a:p>
+            <a:fld id="{1E43DE4C-4A49-D64C-946D-CE146930BB8F}" type="slidenum">
+              <a:rPr lang="en-US" altLang="x-none" smtClean="0"/>
+              <a:pPr/>
               <a:t>8</a:t>
             </a:fld>
             <a:endParaRPr lang="en-US" altLang="x-none"/>
@@ -1237,6 +1348,114 @@
     <p:extLst>
       <p:ext uri="{BB962C8B-B14F-4D97-AF65-F5344CB8AC3E}">
         <p14:creationId xmlns:p14="http://schemas.microsoft.com/office/powerpoint/2010/main" val="1591834426"/>
+      </p:ext>
+    </p:extLst>
+  </p:cSld>
+  <p:clrMapOvr>
+    <a:masterClrMapping/>
+  </p:clrMapOvr>
+</p:notes>
+</file>
+
+<file path=ppt/notesSlides/notesSlide7.xml><?xml version="1.0" encoding="utf-8"?>
+<p:notes xmlns:a="http://schemas.openxmlformats.org/drawingml/2006/main" xmlns:r="http://schemas.openxmlformats.org/officeDocument/2006/relationships" xmlns:p="http://schemas.openxmlformats.org/presentationml/2006/main">
+  <p:cSld>
+    <p:spTree>
+      <p:nvGrpSpPr>
+        <p:cNvPr id="1" name=""/>
+        <p:cNvGrpSpPr/>
+        <p:nvPr/>
+      </p:nvGrpSpPr>
+      <p:grpSpPr>
+        <a:xfrm>
+          <a:off x="0" y="0"/>
+          <a:ext cx="0" cy="0"/>
+          <a:chOff x="0" y="0"/>
+          <a:chExt cx="0" cy="0"/>
+        </a:xfrm>
+      </p:grpSpPr>
+      <p:sp>
+        <p:nvSpPr>
+          <p:cNvPr id="2" name="Slide Image Placeholder 1"/>
+          <p:cNvSpPr>
+            <a:spLocks noGrp="1" noRot="1" noChangeAspect="1"/>
+          </p:cNvSpPr>
+          <p:nvPr>
+            <p:ph type="sldImg"/>
+          </p:nvPr>
+        </p:nvSpPr>
+        <p:spPr/>
+      </p:sp>
+      <p:sp>
+        <p:nvSpPr>
+          <p:cNvPr id="3" name="Notes Placeholder 2"/>
+          <p:cNvSpPr>
+            <a:spLocks noGrp="1"/>
+          </p:cNvSpPr>
+          <p:nvPr>
+            <p:ph type="body" idx="1"/>
+          </p:nvPr>
+        </p:nvSpPr>
+        <p:spPr/>
+        <p:txBody>
+          <a:bodyPr/>
+          <a:lstStyle/>
+          <a:p>
+            <a:r>
+              <a:rPr lang="en-US" dirty="0" smtClean="0"/>
+              <a:t>Do we need to tell students correlation</a:t>
+            </a:r>
+            <a:r>
+              <a:rPr lang="en-US" baseline="0" dirty="0" smtClean="0"/>
+              <a:t> between 0-0.3 means weak, between 0.3-0.6 means moderately strong and above 0.6 means strong?</a:t>
+            </a:r>
+            <a:endParaRPr lang="en-US" dirty="0" smtClean="0"/>
+          </a:p>
+          <a:p>
+            <a:r>
+              <a:rPr lang="en-US" dirty="0" smtClean="0"/>
+              <a:t>What </a:t>
+            </a:r>
+            <a:r>
+              <a:rPr lang="en-US" smtClean="0"/>
+              <a:t>does quantile </a:t>
+            </a:r>
+            <a:r>
+              <a:rPr lang="en-US" dirty="0" smtClean="0"/>
+              <a:t>quantile plot really do? Why we need to use it for data analysis?</a:t>
+            </a:r>
+            <a:endParaRPr lang="en-US" dirty="0"/>
+          </a:p>
+        </p:txBody>
+      </p:sp>
+      <p:sp>
+        <p:nvSpPr>
+          <p:cNvPr id="4" name="Slide Number Placeholder 3"/>
+          <p:cNvSpPr>
+            <a:spLocks noGrp="1"/>
+          </p:cNvSpPr>
+          <p:nvPr>
+            <p:ph type="sldNum" sz="quarter" idx="10"/>
+          </p:nvPr>
+        </p:nvSpPr>
+        <p:spPr/>
+        <p:txBody>
+          <a:bodyPr/>
+          <a:lstStyle/>
+          <a:p>
+            <a:fld id="{1E43DE4C-4A49-D64C-946D-CE146930BB8F}" type="slidenum">
+              <a:rPr lang="en-US" altLang="x-none" smtClean="0"/>
+              <a:pPr/>
+              <a:t>9</a:t>
+            </a:fld>
+            <a:endParaRPr lang="en-US" altLang="x-none"/>
+          </a:p>
+        </p:txBody>
+      </p:sp>
+    </p:spTree>
+    <p:extLst>
+      <p:ext uri="{BB962C8B-B14F-4D97-AF65-F5344CB8AC3E}">
+        <p14:creationId xmlns:p14="http://schemas.microsoft.com/office/powerpoint/2010/main" val="399287073"/>
       </p:ext>
     </p:extLst>
   </p:cSld>
@@ -1453,14 +1672,14 @@
           </a:ln>
           <a:extLst>
             <a:ext uri="{909E8E84-426E-40dd-AFC4-6F175D3DCCD1}">
-              <a14:hiddenFill xmlns:a14="http://schemas.microsoft.com/office/drawing/2010/main">
+              <a14:hiddenFill xmlns:a14="http://schemas.microsoft.com/office/drawing/2010/main" xmlns="">
                 <a:solidFill>
                   <a:srgbClr val="FFFFFF"/>
                 </a:solidFill>
               </a14:hiddenFill>
             </a:ext>
             <a:ext uri="{91240B29-F687-4f45-9708-019B960494DF}">
-              <a14:hiddenLine xmlns:a14="http://schemas.microsoft.com/office/drawing/2010/main" w="9525">
+              <a14:hiddenLine xmlns:a14="http://schemas.microsoft.com/office/drawing/2010/main" xmlns="" w="9525">
                 <a:solidFill>
                   <a:srgbClr val="000000"/>
                 </a:solidFill>
@@ -1706,7 +1925,7 @@
   <p:clrMapOvr>
     <a:masterClrMapping/>
   </p:clrMapOvr>
-  <p:transition xmlns:p14="http://schemas.microsoft.com/office/powerpoint/2010/main" spd="slow">
+  <p:transition spd="slow">
     <p:fade/>
   </p:transition>
 </p:sldLayout>
@@ -1919,14 +2138,14 @@
           </a:ln>
           <a:extLst>
             <a:ext uri="{909E8E84-426E-40dd-AFC4-6F175D3DCCD1}">
-              <a14:hiddenFill xmlns:a14="http://schemas.microsoft.com/office/drawing/2010/main">
+              <a14:hiddenFill xmlns:a14="http://schemas.microsoft.com/office/drawing/2010/main" xmlns="">
                 <a:solidFill>
                   <a:srgbClr val="FFFFFF"/>
                 </a:solidFill>
               </a14:hiddenFill>
             </a:ext>
             <a:ext uri="{91240B29-F687-4f45-9708-019B960494DF}">
-              <a14:hiddenLine xmlns:a14="http://schemas.microsoft.com/office/drawing/2010/main" w="9525">
+              <a14:hiddenLine xmlns:a14="http://schemas.microsoft.com/office/drawing/2010/main" xmlns="" w="9525">
                 <a:solidFill>
                   <a:srgbClr val="000000"/>
                 </a:solidFill>
@@ -2120,7 +2339,7 @@
   <p:clrMapOvr>
     <a:masterClrMapping/>
   </p:clrMapOvr>
-  <p:transition xmlns:p14="http://schemas.microsoft.com/office/powerpoint/2010/main" spd="slow">
+  <p:transition spd="slow">
     <p:fade/>
   </p:transition>
 </p:sldLayout>
@@ -2253,7 +2472,7 @@
   <p:clrMapOvr>
     <a:masterClrMapping/>
   </p:clrMapOvr>
-  <p:transition xmlns:p14="http://schemas.microsoft.com/office/powerpoint/2010/main" spd="slow">
+  <p:transition spd="slow">
     <p:fade/>
   </p:transition>
 </p:sldLayout>
@@ -2594,7 +2813,7 @@
   <p:clrMapOvr>
     <a:masterClrMapping/>
   </p:clrMapOvr>
-  <p:transition xmlns:p14="http://schemas.microsoft.com/office/powerpoint/2010/main" spd="slow">
+  <p:transition spd="slow">
     <p:fade/>
   </p:transition>
 </p:sldLayout>
@@ -2788,7 +3007,7 @@
   <p:clrMapOvr>
     <a:masterClrMapping/>
   </p:clrMapOvr>
-  <p:transition xmlns:p14="http://schemas.microsoft.com/office/powerpoint/2010/main" spd="slow">
+  <p:transition spd="slow">
     <p:fade/>
   </p:transition>
 </p:sldLayout>
@@ -3043,7 +3262,7 @@
   <p:clrMapOvr>
     <a:masterClrMapping/>
   </p:clrMapOvr>
-  <p:transition xmlns:p14="http://schemas.microsoft.com/office/powerpoint/2010/main" spd="slow">
+  <p:transition spd="slow">
     <p:fade/>
   </p:transition>
 </p:sldLayout>
@@ -3359,7 +3578,7 @@
   <p:clrMapOvr>
     <a:masterClrMapping/>
   </p:clrMapOvr>
-  <p:transition xmlns:p14="http://schemas.microsoft.com/office/powerpoint/2010/main" spd="slow">
+  <p:transition spd="slow">
     <p:fade/>
   </p:transition>
 </p:sldLayout>
@@ -3572,14 +3791,14 @@
           </a:ln>
           <a:extLst>
             <a:ext uri="{909E8E84-426E-40dd-AFC4-6F175D3DCCD1}">
-              <a14:hiddenFill xmlns:a14="http://schemas.microsoft.com/office/drawing/2010/main">
+              <a14:hiddenFill xmlns:a14="http://schemas.microsoft.com/office/drawing/2010/main" xmlns="">
                 <a:solidFill>
                   <a:srgbClr val="FFFFFF"/>
                 </a:solidFill>
               </a14:hiddenFill>
             </a:ext>
             <a:ext uri="{91240B29-F687-4f45-9708-019B960494DF}">
-              <a14:hiddenLine xmlns:a14="http://schemas.microsoft.com/office/drawing/2010/main" w="9525">
+              <a14:hiddenLine xmlns:a14="http://schemas.microsoft.com/office/drawing/2010/main" xmlns="" w="9525">
                 <a:solidFill>
                   <a:srgbClr val="000000"/>
                 </a:solidFill>
@@ -3774,7 +3993,7 @@
   <p:clrMapOvr>
     <a:masterClrMapping/>
   </p:clrMapOvr>
-  <p:transition xmlns:p14="http://schemas.microsoft.com/office/powerpoint/2010/main" spd="slow">
+  <p:transition spd="slow">
     <p:fade/>
   </p:transition>
 </p:sldLayout>
@@ -3903,7 +4122,7 @@
   <p:clrMapOvr>
     <a:masterClrMapping/>
   </p:clrMapOvr>
-  <p:transition xmlns:p14="http://schemas.microsoft.com/office/powerpoint/2010/main" spd="slow">
+  <p:transition spd="slow">
     <p:fade/>
   </p:transition>
 </p:sldLayout>
@@ -4021,7 +4240,7 @@
   <p:clrMapOvr>
     <a:masterClrMapping/>
   </p:clrMapOvr>
-  <p:transition xmlns:p14="http://schemas.microsoft.com/office/powerpoint/2010/main" spd="slow">
+  <p:transition spd="slow">
     <p:fade/>
   </p:transition>
 </p:sldLayout>
@@ -4354,7 +4573,7 @@
   <p:clrMapOvr>
     <a:masterClrMapping/>
   </p:clrMapOvr>
-  <p:transition xmlns:p14="http://schemas.microsoft.com/office/powerpoint/2010/main" spd="slow">
+  <p:transition spd="slow">
     <p:fade/>
   </p:transition>
 </p:sldLayout>
@@ -4540,7 +4759,7 @@
   <p:clrMapOvr>
     <a:masterClrMapping/>
   </p:clrMapOvr>
-  <p:transition xmlns:p14="http://schemas.microsoft.com/office/powerpoint/2010/main" spd="slow">
+  <p:transition spd="slow">
     <p:fade/>
   </p:transition>
 </p:sldLayout>
@@ -4783,7 +5002,7 @@
   <p:clrMapOvr>
     <a:masterClrMapping/>
   </p:clrMapOvr>
-  <p:transition xmlns:p14="http://schemas.microsoft.com/office/powerpoint/2010/main" spd="slow">
+  <p:transition spd="slow">
     <p:fade/>
   </p:transition>
 </p:sldLayout>
@@ -5083,7 +5302,7 @@
   <p:clrMapOvr>
     <a:masterClrMapping/>
   </p:clrMapOvr>
-  <p:transition xmlns:p14="http://schemas.microsoft.com/office/powerpoint/2010/main" spd="slow">
+  <p:transition spd="slow">
     <p:fade/>
   </p:transition>
 </p:sldLayout>
@@ -5141,14 +5360,14 @@
           </a:ln>
           <a:extLst>
             <a:ext uri="{909E8E84-426E-40dd-AFC4-6F175D3DCCD1}">
-              <a14:hiddenFill xmlns:a14="http://schemas.microsoft.com/office/drawing/2010/main">
+              <a14:hiddenFill xmlns:a14="http://schemas.microsoft.com/office/drawing/2010/main" xmlns="">
                 <a:solidFill>
                   <a:srgbClr val="FFFFFF"/>
                 </a:solidFill>
               </a14:hiddenFill>
             </a:ext>
             <a:ext uri="{91240B29-F687-4f45-9708-019B960494DF}">
-              <a14:hiddenLine xmlns:a14="http://schemas.microsoft.com/office/drawing/2010/main" w="9525">
+              <a14:hiddenLine xmlns:a14="http://schemas.microsoft.com/office/drawing/2010/main" xmlns="" w="9525">
                 <a:solidFill>
                   <a:srgbClr val="000000"/>
                 </a:solidFill>
@@ -5350,14 +5569,14 @@
           </a:ln>
           <a:extLst>
             <a:ext uri="{909E8E84-426E-40dd-AFC4-6F175D3DCCD1}">
-              <a14:hiddenFill xmlns:a14="http://schemas.microsoft.com/office/drawing/2010/main">
+              <a14:hiddenFill xmlns:a14="http://schemas.microsoft.com/office/drawing/2010/main" xmlns="">
                 <a:solidFill>
                   <a:srgbClr val="FFFFFF"/>
                 </a:solidFill>
               </a14:hiddenFill>
             </a:ext>
             <a:ext uri="{91240B29-F687-4f45-9708-019B960494DF}">
-              <a14:hiddenLine xmlns:a14="http://schemas.microsoft.com/office/drawing/2010/main" w="9525">
+              <a14:hiddenLine xmlns:a14="http://schemas.microsoft.com/office/drawing/2010/main" xmlns="" w="9525">
                 <a:solidFill>
                   <a:srgbClr val="000000"/>
                 </a:solidFill>
@@ -5603,7 +5822,7 @@
   <p:clrMapOvr>
     <a:masterClrMapping/>
   </p:clrMapOvr>
-  <p:transition xmlns:p14="http://schemas.microsoft.com/office/powerpoint/2010/main" spd="slow">
+  <p:transition spd="slow">
     <p:fade/>
   </p:transition>
 </p:sldLayout>
@@ -5654,15 +5873,18 @@
             <a:noFill/>
           </a:ln>
           <a:extLst>
+            <a:ext uri="{FAA26D3D-D897-4be2-8F04-BA451C77F1D7}">
+              <ma14:placeholderFlag xmlns:ma14="http://schemas.microsoft.com/office/mac/drawingml/2011/main" val="1"/>
+            </a:ext>
             <a:ext uri="{909E8E84-426E-40dd-AFC4-6F175D3DCCD1}">
-              <a14:hiddenFill xmlns:a14="http://schemas.microsoft.com/office/drawing/2010/main">
+              <a14:hiddenFill xmlns:a14="http://schemas.microsoft.com/office/drawing/2010/main" xmlns="">
                 <a:solidFill>
                   <a:srgbClr val="FFFFFF"/>
                 </a:solidFill>
               </a14:hiddenFill>
             </a:ext>
             <a:ext uri="{91240B29-F687-4f45-9708-019B960494DF}">
-              <a14:hiddenLine xmlns:a14="http://schemas.microsoft.com/office/drawing/2010/main" w="9525">
+              <a14:hiddenLine xmlns:a14="http://schemas.microsoft.com/office/drawing/2010/main" xmlns="" w="9525">
                 <a:solidFill>
                   <a:srgbClr val="000000"/>
                 </a:solidFill>
@@ -5670,9 +5892,6 @@
                 <a:headEnd/>
                 <a:tailEnd/>
               </a14:hiddenLine>
-            </a:ext>
-            <a:ext uri="{FAA26D3D-D897-4be2-8F04-BA451C77F1D7}">
-              <ma14:placeholderFlag xmlns:ma14="http://schemas.microsoft.com/office/mac/drawingml/2011/main" val="1"/>
             </a:ext>
           </a:extLst>
         </p:spPr>
@@ -5892,14 +6111,14 @@
           </a:ln>
           <a:extLst>
             <a:ext uri="{909E8E84-426E-40dd-AFC4-6F175D3DCCD1}">
-              <a14:hiddenFill xmlns:a14="http://schemas.microsoft.com/office/drawing/2010/main">
+              <a14:hiddenFill xmlns:a14="http://schemas.microsoft.com/office/drawing/2010/main" xmlns="">
                 <a:solidFill>
                   <a:srgbClr val="FFFFFF"/>
                 </a:solidFill>
               </a14:hiddenFill>
             </a:ext>
             <a:ext uri="{91240B29-F687-4f45-9708-019B960494DF}">
-              <a14:hiddenLine xmlns:a14="http://schemas.microsoft.com/office/drawing/2010/main" w="9525">
+              <a14:hiddenLine xmlns:a14="http://schemas.microsoft.com/office/drawing/2010/main" xmlns="" w="9525">
                 <a:solidFill>
                   <a:srgbClr val="000000"/>
                 </a:solidFill>
@@ -5924,13 +6143,13 @@
     <p:sldLayoutId id="2147484090" r:id="rId7"/>
     <p:sldLayoutId id="2147484091" r:id="rId8"/>
   </p:sldLayoutIdLst>
-  <p:transition xmlns:p14="http://schemas.microsoft.com/office/powerpoint/2010/main" spd="slow">
+  <p:transition spd="slow">
     <p:fade/>
   </p:transition>
   <p:timing>
     <p:tnLst>
       <p:par>
-        <p:cTn xmlns:p14="http://schemas.microsoft.com/office/powerpoint/2010/main" id="1" dur="indefinite" restart="never" nodeType="tmRoot"/>
+        <p:cTn id="1" dur="indefinite" restart="never" nodeType="tmRoot"/>
       </p:par>
     </p:tnLst>
   </p:timing>
@@ -6420,15 +6639,18 @@
             <a:noFill/>
           </a:ln>
           <a:extLst>
+            <a:ext uri="{FAA26D3D-D897-4be2-8F04-BA451C77F1D7}">
+              <ma14:placeholderFlag xmlns:ma14="http://schemas.microsoft.com/office/mac/drawingml/2011/main" val="1"/>
+            </a:ext>
             <a:ext uri="{909E8E84-426E-40dd-AFC4-6F175D3DCCD1}">
-              <a14:hiddenFill xmlns:a14="http://schemas.microsoft.com/office/drawing/2010/main">
+              <a14:hiddenFill xmlns:a14="http://schemas.microsoft.com/office/drawing/2010/main" xmlns="">
                 <a:solidFill>
                   <a:srgbClr val="FFFFFF"/>
                 </a:solidFill>
               </a14:hiddenFill>
             </a:ext>
             <a:ext uri="{91240B29-F687-4f45-9708-019B960494DF}">
-              <a14:hiddenLine xmlns:a14="http://schemas.microsoft.com/office/drawing/2010/main" w="9525">
+              <a14:hiddenLine xmlns:a14="http://schemas.microsoft.com/office/drawing/2010/main" xmlns="" w="9525">
                 <a:solidFill>
                   <a:srgbClr val="000000"/>
                 </a:solidFill>
@@ -6436,9 +6658,6 @@
                 <a:headEnd/>
                 <a:tailEnd/>
               </a14:hiddenLine>
-            </a:ext>
-            <a:ext uri="{FAA26D3D-D897-4be2-8F04-BA451C77F1D7}">
-              <ma14:placeholderFlag xmlns:ma14="http://schemas.microsoft.com/office/mac/drawingml/2011/main" val="1"/>
             </a:ext>
           </a:extLst>
         </p:spPr>
@@ -6660,14 +6879,14 @@
           </a:ln>
           <a:extLst>
             <a:ext uri="{909E8E84-426E-40dd-AFC4-6F175D3DCCD1}">
-              <a14:hiddenFill xmlns:a14="http://schemas.microsoft.com/office/drawing/2010/main">
+              <a14:hiddenFill xmlns:a14="http://schemas.microsoft.com/office/drawing/2010/main" xmlns="">
                 <a:solidFill>
                   <a:srgbClr val="FFFFFF"/>
                 </a:solidFill>
               </a14:hiddenFill>
             </a:ext>
             <a:ext uri="{91240B29-F687-4f45-9708-019B960494DF}">
-              <a14:hiddenLine xmlns:a14="http://schemas.microsoft.com/office/drawing/2010/main" w="9525">
+              <a14:hiddenLine xmlns:a14="http://schemas.microsoft.com/office/drawing/2010/main" xmlns="" w="9525">
                 <a:solidFill>
                   <a:srgbClr val="000000"/>
                 </a:solidFill>
@@ -6691,13 +6910,13 @@
     <p:sldLayoutId id="2147484097" r:id="rId6"/>
     <p:sldLayoutId id="2147484098" r:id="rId7"/>
   </p:sldLayoutIdLst>
-  <p:transition xmlns:p14="http://schemas.microsoft.com/office/powerpoint/2010/main" spd="slow">
+  <p:transition spd="slow">
     <p:fade/>
   </p:transition>
   <p:timing>
     <p:tnLst>
       <p:par>
-        <p:cTn xmlns:p14="http://schemas.microsoft.com/office/powerpoint/2010/main" id="1" dur="indefinite" restart="never" nodeType="tmRoot"/>
+        <p:cTn id="1" dur="indefinite" restart="never" nodeType="tmRoot"/>
       </p:par>
     </p:tnLst>
   </p:timing>
@@ -7317,13 +7536,13 @@
   <p:clrMapOvr>
     <a:masterClrMapping/>
   </p:clrMapOvr>
-  <p:transition xmlns:p14="http://schemas.microsoft.com/office/powerpoint/2010/main" spd="slow">
+  <p:transition spd="slow">
     <p:fade/>
   </p:transition>
   <p:timing>
     <p:tnLst>
       <p:par>
-        <p:cTn xmlns:p14="http://schemas.microsoft.com/office/powerpoint/2010/main" id="1" dur="indefinite" restart="never" nodeType="tmRoot"/>
+        <p:cTn id="1" dur="indefinite" restart="never" nodeType="tmRoot"/>
       </p:par>
     </p:tnLst>
   </p:timing>
@@ -7387,13 +7606,13 @@
   <p:clrMapOvr>
     <a:masterClrMapping/>
   </p:clrMapOvr>
-  <p:transition xmlns:p14="http://schemas.microsoft.com/office/powerpoint/2010/main" spd="slow">
+  <p:transition spd="slow">
     <p:fade/>
   </p:transition>
   <p:timing>
     <p:tnLst>
       <p:par>
-        <p:cTn xmlns:p14="http://schemas.microsoft.com/office/powerpoint/2010/main" id="1" dur="indefinite" restart="never" nodeType="tmRoot"/>
+        <p:cTn id="1" dur="indefinite" restart="never" nodeType="tmRoot"/>
       </p:par>
     </p:tnLst>
   </p:timing>
@@ -7586,13 +7805,13 @@
   <p:clrMapOvr>
     <a:masterClrMapping/>
   </p:clrMapOvr>
-  <p:transition xmlns:p14="http://schemas.microsoft.com/office/powerpoint/2010/main" spd="slow">
+  <p:transition spd="slow">
     <p:fade/>
   </p:transition>
   <p:timing>
     <p:tnLst>
       <p:par>
-        <p:cTn xmlns:p14="http://schemas.microsoft.com/office/powerpoint/2010/main" id="1" dur="indefinite" restart="never" nodeType="tmRoot"/>
+        <p:cTn id="1" dur="indefinite" restart="never" nodeType="tmRoot"/>
       </p:par>
     </p:tnLst>
   </p:timing>
@@ -7625,7 +7844,7 @@
           <p:nvPr/>
         </p:nvPicPr>
         <p:blipFill>
-          <a:blip r:embed="rId2">
+          <a:blip r:embed="rId3">
             <a:extLst>
               <a:ext uri="{28A0092B-C50C-407E-A947-70E740481C1C}">
                 <a14:useLocalDpi xmlns:a14="http://schemas.microsoft.com/office/drawing/2010/main" val="0"/>
@@ -7651,13 +7870,13 @@
   <p:clrMapOvr>
     <a:masterClrMapping/>
   </p:clrMapOvr>
-  <p:transition xmlns:p14="http://schemas.microsoft.com/office/powerpoint/2010/main" spd="slow">
+  <p:transition spd="slow">
     <p:fade/>
   </p:transition>
   <p:timing>
     <p:tnLst>
       <p:par>
-        <p:cTn xmlns:p14="http://schemas.microsoft.com/office/powerpoint/2010/main" id="1" dur="indefinite" restart="never" nodeType="tmRoot"/>
+        <p:cTn id="1" dur="indefinite" restart="never" nodeType="tmRoot"/>
       </p:par>
     </p:tnLst>
   </p:timing>
@@ -7960,13 +8179,13 @@
   <p:clrMapOvr>
     <a:masterClrMapping/>
   </p:clrMapOvr>
-  <p:transition xmlns:p14="http://schemas.microsoft.com/office/powerpoint/2010/main" spd="slow">
+  <p:transition spd="slow">
     <p:fade/>
   </p:transition>
   <p:timing>
     <p:tnLst>
       <p:par>
-        <p:cTn xmlns:p14="http://schemas.microsoft.com/office/powerpoint/2010/main" id="1" dur="indefinite" restart="never" nodeType="tmRoot"/>
+        <p:cTn id="1" dur="indefinite" restart="never" nodeType="tmRoot"/>
       </p:par>
     </p:tnLst>
   </p:timing>
@@ -8242,14 +8461,6 @@
               </a:rPr>
               <a:t>evel()</a:t>
             </a:r>
-            <a:endParaRPr lang="en-US" dirty="0" smtClean="0">
-              <a:solidFill>
-                <a:schemeClr val="tx1">
-                  <a:lumMod val="65000"/>
-                  <a:lumOff val="35000"/>
-                </a:schemeClr>
-              </a:solidFill>
-            </a:endParaRPr>
           </a:p>
           <a:p>
             <a:pPr marL="0" indent="0" fontAlgn="auto">
@@ -8296,13 +8507,13 @@
   <p:clrMapOvr>
     <a:masterClrMapping/>
   </p:clrMapOvr>
-  <p:transition xmlns:p14="http://schemas.microsoft.com/office/powerpoint/2010/main" spd="slow">
+  <p:transition spd="slow">
     <p:fade/>
   </p:transition>
   <p:timing>
     <p:tnLst>
       <p:par>
-        <p:cTn xmlns:p14="http://schemas.microsoft.com/office/powerpoint/2010/main" id="1" dur="indefinite" restart="never" nodeType="tmRoot"/>
+        <p:cTn id="1" dur="indefinite" restart="never" nodeType="tmRoot"/>
       </p:par>
     </p:tnLst>
   </p:timing>
@@ -8386,7 +8597,7 @@
   <p:clrMapOvr>
     <a:masterClrMapping/>
   </p:clrMapOvr>
-  <p:transition xmlns:p14="http://schemas.microsoft.com/office/powerpoint/2010/main" spd="slow">
+  <p:transition spd="slow">
     <p:fade/>
   </p:transition>
 </p:sld>
@@ -8438,17 +8649,7 @@
                 <a:latin typeface="Arial" charset="0"/>
                 <a:ea typeface="ＭＳ Ｐゴシック" charset="-128"/>
               </a:rPr>
-              <a:t>Review: Descriptive stats for different </a:t>
-            </a:r>
-            <a:r>
-              <a:rPr lang="en-US" altLang="x-none" dirty="0" smtClean="0">
-                <a:solidFill>
-                  <a:srgbClr val="002060"/>
-                </a:solidFill>
-                <a:latin typeface="Arial" charset="0"/>
-                <a:ea typeface="ＭＳ Ｐゴシック" charset="-128"/>
-              </a:rPr>
-              <a:t>variables</a:t>
+              <a:t>Review: Descriptive stats for different variables</a:t>
             </a:r>
             <a:endParaRPr lang="en-US" altLang="x-none" dirty="0">
               <a:solidFill>
@@ -8527,43 +8728,7 @@
                 </a:solidFill>
                 <a:ea typeface="+mn-ea"/>
               </a:rPr>
-              <a:t>Good for categorical variables (</a:t>
-            </a:r>
-            <a:r>
-              <a:rPr lang="en-US" dirty="0" smtClean="0">
-                <a:solidFill>
-                  <a:schemeClr val="tx1">
-                    <a:lumMod val="65000"/>
-                    <a:lumOff val="35000"/>
-                  </a:schemeClr>
-                </a:solidFill>
-                <a:ea typeface="+mn-ea"/>
-              </a:rPr>
-              <a:t>Nominal</a:t>
-            </a:r>
-            <a:r>
-              <a:rPr lang="en-US" dirty="0" smtClean="0">
-                <a:solidFill>
-                  <a:schemeClr val="tx1">
-                    <a:lumMod val="65000"/>
-                    <a:lumOff val="35000"/>
-                  </a:schemeClr>
-                </a:solidFill>
-                <a:ea typeface="+mn-ea"/>
-              </a:rPr>
-              <a:t>, Ordinal, Interval</a:t>
-            </a:r>
-            <a:r>
-              <a:rPr lang="en-US" dirty="0" smtClean="0">
-                <a:solidFill>
-                  <a:schemeClr val="tx1">
-                    <a:lumMod val="65000"/>
-                    <a:lumOff val="35000"/>
-                  </a:schemeClr>
-                </a:solidFill>
-                <a:ea typeface="+mn-ea"/>
-              </a:rPr>
-              <a:t>)</a:t>
+              <a:t>Good for categorical variables (Nominal, Ordinal, Interval)</a:t>
             </a:r>
           </a:p>
           <a:p>
@@ -8587,31 +8752,7 @@
                 </a:solidFill>
                 <a:ea typeface="+mn-ea"/>
               </a:rPr>
-              <a:t>Plot proportion or count on </a:t>
-            </a:r>
-            <a:r>
-              <a:rPr lang="en-US" dirty="0" smtClean="0">
-                <a:solidFill>
-                  <a:schemeClr val="tx1">
-                    <a:lumMod val="65000"/>
-                    <a:lumOff val="35000"/>
-                  </a:schemeClr>
-                </a:solidFill>
-                <a:ea typeface="+mn-ea"/>
-              </a:rPr>
-              <a:t>y </a:t>
-            </a:r>
-            <a:r>
-              <a:rPr lang="en-US" dirty="0" smtClean="0">
-                <a:solidFill>
-                  <a:schemeClr val="tx1">
-                    <a:lumMod val="65000"/>
-                    <a:lumOff val="35000"/>
-                  </a:schemeClr>
-                </a:solidFill>
-                <a:ea typeface="+mn-ea"/>
-              </a:rPr>
-              <a:t>axis</a:t>
+              <a:t>Plot proportion or count on y axis</a:t>
             </a:r>
           </a:p>
           <a:p>
@@ -8635,43 +8776,7 @@
                 </a:solidFill>
                 <a:ea typeface="+mn-ea"/>
               </a:rPr>
-              <a:t>Tells us h</a:t>
-            </a:r>
-            <a:r>
-              <a:rPr lang="en-US" dirty="0" smtClean="0">
-                <a:solidFill>
-                  <a:schemeClr val="tx1">
-                    <a:lumMod val="65000"/>
-                    <a:lumOff val="35000"/>
-                  </a:schemeClr>
-                </a:solidFill>
-                <a:ea typeface="+mn-ea"/>
-              </a:rPr>
-              <a:t>ow many or what proportion of data </a:t>
-            </a:r>
-            <a:r>
-              <a:rPr lang="en-US" dirty="0" smtClean="0">
-                <a:solidFill>
-                  <a:schemeClr val="tx1">
-                    <a:lumMod val="65000"/>
-                    <a:lumOff val="35000"/>
-                  </a:schemeClr>
-                </a:solidFill>
-                <a:ea typeface="+mn-ea"/>
-              </a:rPr>
-              <a:t>are in each </a:t>
-            </a:r>
-            <a:r>
-              <a:rPr lang="en-US" dirty="0" smtClean="0">
-                <a:solidFill>
-                  <a:schemeClr val="tx1">
-                    <a:lumMod val="65000"/>
-                    <a:lumOff val="35000"/>
-                  </a:schemeClr>
-                </a:solidFill>
-                <a:ea typeface="+mn-ea"/>
-              </a:rPr>
-              <a:t>category</a:t>
+              <a:t>Tells us how many or what proportion of data are in each category</a:t>
             </a:r>
           </a:p>
           <a:p>
@@ -8709,15 +8814,6 @@
               </a:rPr>
               <a:t>()</a:t>
             </a:r>
-            <a:endParaRPr lang="en-US" dirty="0" smtClean="0">
-              <a:solidFill>
-                <a:schemeClr val="tx1">
-                  <a:lumMod val="65000"/>
-                  <a:lumOff val="35000"/>
-                </a:schemeClr>
-              </a:solidFill>
-              <a:ea typeface="+mn-ea"/>
-            </a:endParaRPr>
           </a:p>
           <a:p>
             <a:pPr marL="285750" marR="0" lvl="2" indent="-285750" defTabSz="914400" eaLnBrk="1" fontAlgn="auto" latinLnBrk="0" hangingPunct="1">
@@ -8769,19 +8865,7 @@
                 </a:solidFill>
                 <a:ea typeface="+mn-ea"/>
               </a:rPr>
-              <a:t>Histogram: </a:t>
-            </a:r>
-            <a:r>
-              <a:rPr lang="en-US" dirty="0" smtClean="0">
-                <a:solidFill>
-                  <a:schemeClr val="tx1">
-                    <a:lumMod val="65000"/>
-                    <a:lumOff val="35000"/>
-                  </a:schemeClr>
-                </a:solidFill>
-                <a:ea typeface="+mn-ea"/>
-              </a:rPr>
-              <a:t>Use for numeric variables</a:t>
+              <a:t>Histogram: Use for numeric variables</a:t>
             </a:r>
             <a:endParaRPr lang="en-US" dirty="0">
               <a:solidFill>
@@ -8876,15 +8960,6 @@
               </a:rPr>
               <a:t>Density plot: proportion of observations within each bin divided by the width of the bin. ((Number of people age 0-10/all people)/ 10)</a:t>
             </a:r>
-            <a:endParaRPr lang="en-US" dirty="0" smtClean="0">
-              <a:solidFill>
-                <a:schemeClr val="tx1">
-                  <a:lumMod val="65000"/>
-                  <a:lumOff val="35000"/>
-                </a:schemeClr>
-              </a:solidFill>
-              <a:ea typeface="+mn-ea"/>
-            </a:endParaRPr>
           </a:p>
           <a:p>
             <a:pPr marL="0" marR="0" lvl="2" indent="0" defTabSz="914400" eaLnBrk="1" fontAlgn="auto" latinLnBrk="0" hangingPunct="1">
@@ -9078,13 +9153,13 @@
   <p:clrMapOvr>
     <a:masterClrMapping/>
   </p:clrMapOvr>
-  <p:transition xmlns:p14="http://schemas.microsoft.com/office/powerpoint/2010/main" spd="slow">
+  <p:transition spd="slow">
     <p:fade/>
   </p:transition>
   <p:timing>
     <p:tnLst>
       <p:par>
-        <p:cTn xmlns:p14="http://schemas.microsoft.com/office/powerpoint/2010/main" id="1" dur="indefinite" restart="never" nodeType="tmRoot"/>
+        <p:cTn id="1" dur="indefinite" restart="never" nodeType="tmRoot"/>
       </p:par>
     </p:tnLst>
   </p:timing>
@@ -9136,13 +9211,6 @@
               </a:rPr>
               <a:t>Review Spread: </a:t>
             </a:r>
-            <a:r>
-              <a:rPr lang="en-US" altLang="x-none" dirty="0" smtClean="0">
-                <a:latin typeface="Arial" charset="0"/>
-                <a:ea typeface="ＭＳ Ｐゴシック" charset="-128"/>
-              </a:rPr>
-              <a:t/>
-            </a:r>
             <a:br>
               <a:rPr lang="en-US" altLang="x-none" dirty="0" smtClean="0">
                 <a:latin typeface="Arial" charset="0"/>
@@ -9154,21 +9222,7 @@
                 <a:latin typeface="Arial" charset="0"/>
                 <a:ea typeface="ＭＳ Ｐゴシック" charset="-128"/>
               </a:rPr>
-              <a:t>Interquartile </a:t>
-            </a:r>
-            <a:r>
-              <a:rPr lang="en-US" altLang="x-none" dirty="0" smtClean="0">
-                <a:latin typeface="Arial" charset="0"/>
-                <a:ea typeface="ＭＳ Ｐゴシック" charset="-128"/>
-              </a:rPr>
-              <a:t>ranges and </a:t>
-            </a:r>
-            <a:r>
-              <a:rPr lang="en-US" altLang="x-none" dirty="0" smtClean="0">
-                <a:latin typeface="Arial" charset="0"/>
-                <a:ea typeface="ＭＳ Ｐゴシック" charset="-128"/>
-              </a:rPr>
-              <a:t>outliers and BOXPLOT</a:t>
+              <a:t>Interquartile ranges and outliers and BOXPLOT</a:t>
             </a:r>
             <a:endParaRPr lang="en-US" altLang="x-none" dirty="0">
               <a:latin typeface="Arial" charset="0"/>
@@ -9457,43 +9511,7 @@
                 </a:solidFill>
                 <a:ea typeface="+mn-ea"/>
               </a:rPr>
-              <a:t> </a:t>
-            </a:r>
-            <a:r>
-              <a:rPr lang="en-US" dirty="0" smtClean="0">
-                <a:solidFill>
-                  <a:schemeClr val="tx1">
-                    <a:lumMod val="65000"/>
-                    <a:lumOff val="35000"/>
-                  </a:schemeClr>
-                </a:solidFill>
-                <a:ea typeface="+mn-ea"/>
-              </a:rPr>
-              <a:t>quartiles</a:t>
-            </a:r>
-            <a:r>
-              <a:rPr lang="en-US" dirty="0" smtClean="0">
-                <a:solidFill>
-                  <a:schemeClr val="tx1">
-                    <a:lumMod val="65000"/>
-                    <a:lumOff val="35000"/>
-                  </a:schemeClr>
-                </a:solidFill>
-                <a:ea typeface="+mn-ea"/>
-              </a:rPr>
-              <a:t>, whiskers = + 1.5 times IQR</a:t>
-            </a:r>
-            <a:r>
-              <a:rPr lang="en-US" dirty="0" smtClean="0">
-                <a:solidFill>
-                  <a:schemeClr val="tx1">
-                    <a:lumMod val="65000"/>
-                    <a:lumOff val="35000"/>
-                  </a:schemeClr>
-                </a:solidFill>
-                <a:ea typeface="+mn-ea"/>
-              </a:rPr>
-              <a:t>)</a:t>
+              <a:t> quartiles, whiskers = + 1.5 times IQR)</a:t>
             </a:r>
           </a:p>
           <a:p>
@@ -9529,15 +9547,6 @@
               </a:rPr>
               <a:t>oxplot()</a:t>
             </a:r>
-            <a:endParaRPr lang="en-US" dirty="0" smtClean="0">
-              <a:solidFill>
-                <a:schemeClr val="tx1">
-                  <a:lumMod val="65000"/>
-                  <a:lumOff val="35000"/>
-                </a:schemeClr>
-              </a:solidFill>
-              <a:ea typeface="+mn-ea"/>
-            </a:endParaRPr>
           </a:p>
         </p:txBody>
       </p:sp>
@@ -9551,13 +9560,13 @@
   <p:clrMapOvr>
     <a:masterClrMapping/>
   </p:clrMapOvr>
-  <p:transition xmlns:p14="http://schemas.microsoft.com/office/powerpoint/2010/main" spd="slow">
+  <p:transition spd="slow">
     <p:fade/>
   </p:transition>
   <p:timing>
     <p:tnLst>
       <p:par>
-        <p:cTn xmlns:p14="http://schemas.microsoft.com/office/powerpoint/2010/main" id="1" dur="indefinite" restart="never" nodeType="tmRoot"/>
+        <p:cTn id="1" dur="indefinite" restart="never" nodeType="tmRoot"/>
       </p:par>
     </p:tnLst>
   </p:timing>
@@ -9757,7 +9766,7 @@
   <p:clrMapOvr>
     <a:masterClrMapping/>
   </p:clrMapOvr>
-  <p:transition xmlns:p14="http://schemas.microsoft.com/office/powerpoint/2010/main" spd="slow">
+  <p:transition spd="slow">
     <p:fade/>
   </p:transition>
 </p:sld>

</xml_diff>